<commit_message>
finished scripts and plotting stoch model figure
</commit_message>
<xml_diff>
--- a/figure-assembly/figure-4.pptx
+++ b/figure-assembly/figure-4.pptx
@@ -243,7 +243,7 @@
           <a:p>
             <a:fld id="{25EC0CD3-564D-9742-98B5-86271438CCE6}" type="datetimeFigureOut">
               <a:rPr lang="en-US" smtClean="0"/>
-              <a:t>10/27/18</a:t>
+              <a:t>11/18/18</a:t>
             </a:fld>
             <a:endParaRPr lang="en-US"/>
           </a:p>
@@ -413,7 +413,7 @@
           <a:p>
             <a:fld id="{25EC0CD3-564D-9742-98B5-86271438CCE6}" type="datetimeFigureOut">
               <a:rPr lang="en-US" smtClean="0"/>
-              <a:t>10/27/18</a:t>
+              <a:t>11/18/18</a:t>
             </a:fld>
             <a:endParaRPr lang="en-US"/>
           </a:p>
@@ -593,7 +593,7 @@
           <a:p>
             <a:fld id="{25EC0CD3-564D-9742-98B5-86271438CCE6}" type="datetimeFigureOut">
               <a:rPr lang="en-US" smtClean="0"/>
-              <a:t>10/27/18</a:t>
+              <a:t>11/18/18</a:t>
             </a:fld>
             <a:endParaRPr lang="en-US"/>
           </a:p>
@@ -763,7 +763,7 @@
           <a:p>
             <a:fld id="{25EC0CD3-564D-9742-98B5-86271438CCE6}" type="datetimeFigureOut">
               <a:rPr lang="en-US" smtClean="0"/>
-              <a:t>10/27/18</a:t>
+              <a:t>11/18/18</a:t>
             </a:fld>
             <a:endParaRPr lang="en-US"/>
           </a:p>
@@ -1007,7 +1007,7 @@
           <a:p>
             <a:fld id="{25EC0CD3-564D-9742-98B5-86271438CCE6}" type="datetimeFigureOut">
               <a:rPr lang="en-US" smtClean="0"/>
-              <a:t>10/27/18</a:t>
+              <a:t>11/18/18</a:t>
             </a:fld>
             <a:endParaRPr lang="en-US"/>
           </a:p>
@@ -1239,7 +1239,7 @@
           <a:p>
             <a:fld id="{25EC0CD3-564D-9742-98B5-86271438CCE6}" type="datetimeFigureOut">
               <a:rPr lang="en-US" smtClean="0"/>
-              <a:t>10/27/18</a:t>
+              <a:t>11/18/18</a:t>
             </a:fld>
             <a:endParaRPr lang="en-US"/>
           </a:p>
@@ -1606,7 +1606,7 @@
           <a:p>
             <a:fld id="{25EC0CD3-564D-9742-98B5-86271438CCE6}" type="datetimeFigureOut">
               <a:rPr lang="en-US" smtClean="0"/>
-              <a:t>10/27/18</a:t>
+              <a:t>11/18/18</a:t>
             </a:fld>
             <a:endParaRPr lang="en-US"/>
           </a:p>
@@ -1724,7 +1724,7 @@
           <a:p>
             <a:fld id="{25EC0CD3-564D-9742-98B5-86271438CCE6}" type="datetimeFigureOut">
               <a:rPr lang="en-US" smtClean="0"/>
-              <a:t>10/27/18</a:t>
+              <a:t>11/18/18</a:t>
             </a:fld>
             <a:endParaRPr lang="en-US"/>
           </a:p>
@@ -1819,7 +1819,7 @@
           <a:p>
             <a:fld id="{25EC0CD3-564D-9742-98B5-86271438CCE6}" type="datetimeFigureOut">
               <a:rPr lang="en-US" smtClean="0"/>
-              <a:t>10/27/18</a:t>
+              <a:t>11/18/18</a:t>
             </a:fld>
             <a:endParaRPr lang="en-US"/>
           </a:p>
@@ -2096,7 +2096,7 @@
           <a:p>
             <a:fld id="{25EC0CD3-564D-9742-98B5-86271438CCE6}" type="datetimeFigureOut">
               <a:rPr lang="en-US" smtClean="0"/>
-              <a:t>10/27/18</a:t>
+              <a:t>11/18/18</a:t>
             </a:fld>
             <a:endParaRPr lang="en-US"/>
           </a:p>
@@ -2353,7 +2353,7 @@
           <a:p>
             <a:fld id="{25EC0CD3-564D-9742-98B5-86271438CCE6}" type="datetimeFigureOut">
               <a:rPr lang="en-US" smtClean="0"/>
-              <a:t>10/27/18</a:t>
+              <a:t>11/18/18</a:t>
             </a:fld>
             <a:endParaRPr lang="en-US"/>
           </a:p>
@@ -2566,7 +2566,7 @@
           <a:p>
             <a:fld id="{25EC0CD3-564D-9742-98B5-86271438CCE6}" type="datetimeFigureOut">
               <a:rPr lang="en-US" smtClean="0"/>
-              <a:t>10/27/18</a:t>
+              <a:t>11/18/18</a:t>
             </a:fld>
             <a:endParaRPr lang="en-US"/>
           </a:p>
@@ -2971,48 +2971,12 @@
           <a:chExt cx="0" cy="0"/>
         </a:xfrm>
       </p:grpSpPr>
-      <p:sp>
-        <p:nvSpPr>
-          <p:cNvPr id="13" name="TextBox 12">
+      <p:pic>
+        <p:nvPicPr>
+          <p:cNvPr id="17" name="Picture 16">
             <a:extLst>
               <a:ext uri="{FF2B5EF4-FFF2-40B4-BE49-F238E27FC236}">
-                <a16:creationId xmlns:a16="http://schemas.microsoft.com/office/drawing/2014/main" id="{9308840A-C341-704D-BBB1-8770F1D934A5}"/>
-              </a:ext>
-            </a:extLst>
-          </p:cNvPr>
-          <p:cNvSpPr txBox="1"/>
-          <p:nvPr/>
-        </p:nvSpPr>
-        <p:spPr>
-          <a:xfrm>
-            <a:off x="272661" y="735452"/>
-            <a:ext cx="653849" cy="447943"/>
-          </a:xfrm>
-          <a:prstGeom prst="rect">
-            <a:avLst/>
-          </a:prstGeom>
-          <a:noFill/>
-        </p:spPr>
-        <p:txBody>
-          <a:bodyPr wrap="square" rtlCol="0">
-            <a:spAutoFit/>
-          </a:bodyPr>
-          <a:lstStyle/>
-          <a:p>
-            <a:pPr algn="ctr"/>
-            <a:r>
-              <a:rPr lang="en-US" sz="2311" dirty="0"/>
-              <a:t>A</a:t>
-            </a:r>
-          </a:p>
-        </p:txBody>
-      </p:sp>
-      <p:pic>
-        <p:nvPicPr>
-          <p:cNvPr id="3" name="Picture 2">
-            <a:extLst>
-              <a:ext uri="{FF2B5EF4-FFF2-40B4-BE49-F238E27FC236}">
-                <a16:creationId xmlns:a16="http://schemas.microsoft.com/office/drawing/2014/main" id="{052D6489-8A8A-E442-A7F8-AAE8002BEE6A}"/>
+                <a16:creationId xmlns:a16="http://schemas.microsoft.com/office/drawing/2014/main" id="{F1371574-189B-5C4F-A5C3-EC08D8FC92CF}"/>
               </a:ext>
             </a:extLst>
           </p:cNvPr>
@@ -3029,14 +2993,50 @@
         </p:blipFill>
         <p:spPr>
           <a:xfrm>
-            <a:off x="795897" y="878361"/>
-            <a:ext cx="8413242" cy="5035550"/>
+            <a:off x="867910" y="928456"/>
+            <a:ext cx="8183961" cy="5184000"/>
           </a:xfrm>
           <a:prstGeom prst="rect">
             <a:avLst/>
           </a:prstGeom>
         </p:spPr>
       </p:pic>
+      <p:sp>
+        <p:nvSpPr>
+          <p:cNvPr id="13" name="TextBox 12">
+            <a:extLst>
+              <a:ext uri="{FF2B5EF4-FFF2-40B4-BE49-F238E27FC236}">
+                <a16:creationId xmlns:a16="http://schemas.microsoft.com/office/drawing/2014/main" id="{9308840A-C341-704D-BBB1-8770F1D934A5}"/>
+              </a:ext>
+            </a:extLst>
+          </p:cNvPr>
+          <p:cNvSpPr txBox="1"/>
+          <p:nvPr/>
+        </p:nvSpPr>
+        <p:spPr>
+          <a:xfrm>
+            <a:off x="331029" y="735452"/>
+            <a:ext cx="653849" cy="447943"/>
+          </a:xfrm>
+          <a:prstGeom prst="rect">
+            <a:avLst/>
+          </a:prstGeom>
+          <a:noFill/>
+        </p:spPr>
+        <p:txBody>
+          <a:bodyPr wrap="square" rtlCol="0">
+            <a:spAutoFit/>
+          </a:bodyPr>
+          <a:lstStyle/>
+          <a:p>
+            <a:pPr algn="ctr"/>
+            <a:r>
+              <a:rPr lang="en-US" sz="2311" dirty="0"/>
+              <a:t>A</a:t>
+            </a:r>
+          </a:p>
+        </p:txBody>
+      </p:sp>
       <p:sp>
         <p:nvSpPr>
           <p:cNvPr id="10" name="TextBox 9">
@@ -3109,35 +3109,6 @@
           </a:p>
         </p:txBody>
       </p:sp>
-      <p:pic>
-        <p:nvPicPr>
-          <p:cNvPr id="4" name="Picture 3">
-            <a:extLst>
-              <a:ext uri="{FF2B5EF4-FFF2-40B4-BE49-F238E27FC236}">
-                <a16:creationId xmlns:a16="http://schemas.microsoft.com/office/drawing/2014/main" id="{D471B6DA-7580-2547-A8FC-5B93298CA4FB}"/>
-              </a:ext>
-            </a:extLst>
-          </p:cNvPr>
-          <p:cNvPicPr>
-            <a:picLocks noChangeAspect="1"/>
-          </p:cNvPicPr>
-          <p:nvPr/>
-        </p:nvPicPr>
-        <p:blipFill rotWithShape="1">
-          <a:blip r:embed="rId3"/>
-          <a:srcRect l="52727" b="50980"/>
-          <a:stretch/>
-        </p:blipFill>
-        <p:spPr>
-          <a:xfrm>
-            <a:off x="5175416" y="866486"/>
-            <a:ext cx="4027429" cy="2468831"/>
-          </a:xfrm>
-          <a:prstGeom prst="rect">
-            <a:avLst/>
-          </a:prstGeom>
-        </p:spPr>
-      </p:pic>
     </p:spTree>
     <p:extLst>
       <p:ext uri="{BB962C8B-B14F-4D97-AF65-F5344CB8AC3E}">

</xml_diff>